<commit_message>
changed gender, appt day of week
</commit_message>
<xml_diff>
--- a/Hospital No Shows.pptx
+++ b/Hospital No Shows.pptx
@@ -191,6 +191,22 @@
             <ac:inkMk id="6" creationId="{93118155-A774-871B-29A3-74157729C518}"/>
           </ac:inkMkLst>
         </pc:inkChg>
+      </pc:sldChg>
+    </pc:docChg>
+  </pc:docChgLst>
+  <pc:docChgLst>
+    <pc:chgData name="Dennis Wang" userId="6c802bbc55b149b4" providerId="LiveId" clId="{A15EE7C2-94A7-4194-AC62-4F6ADF760214}"/>
+    <pc:docChg chg="custSel modSld">
+      <pc:chgData name="Dennis Wang" userId="6c802bbc55b149b4" providerId="LiveId" clId="{A15EE7C2-94A7-4194-AC62-4F6ADF760214}" dt="2024-10-16T17:04:28.068" v="42" actId="20577"/>
+      <pc:docMkLst>
+        <pc:docMk/>
+      </pc:docMkLst>
+      <pc:sldChg chg="modNotesTx">
+        <pc:chgData name="Dennis Wang" userId="6c802bbc55b149b4" providerId="LiveId" clId="{A15EE7C2-94A7-4194-AC62-4F6ADF760214}" dt="2024-10-16T17:04:28.068" v="42" actId="20577"/>
+        <pc:sldMkLst>
+          <pc:docMk/>
+          <pc:sldMk cId="1095619903" sldId="264"/>
+        </pc:sldMkLst>
       </pc:sldChg>
     </pc:docChg>
   </pc:docChgLst>
@@ -799,7 +815,7 @@
           <a:p>
             <a:fld id="{C8CC8A46-8213-425B-8071-69F455F20C57}" type="datetimeFigureOut">
               <a:rPr lang="en-US" smtClean="0"/>
-              <a:t>10/15/2024</a:t>
+              <a:t>10/16/2024</a:t>
             </a:fld>
             <a:endParaRPr lang="en-US"/>
           </a:p>
@@ -1111,16 +1127,16 @@
           <a:lstStyle/>
           <a:p>
             <a:r>
-              <a:rPr lang="en-US" dirty="0"/>
+              <a:rPr lang="en-US"/>
               <a:t>Note: The scholarship program has strict conditions such as requiring to be vaccinated and children attending school, so it’s not strictly that the patient is of low-income. </a:t>
             </a:r>
             <a:r>
-              <a:rPr lang="en-US" dirty="0">
+              <a:rPr lang="en-US">
                 <a:hlinkClick r:id="rId3"/>
               </a:rPr>
               <a:t>Bolsa Família - Wikipedia</a:t>
             </a:r>
-            <a:endParaRPr lang="en-US" dirty="0"/>
+            <a:endParaRPr lang="en-US"/>
           </a:p>
         </p:txBody>
       </p:sp>
@@ -1151,6 +1167,178 @@
     <p:extLst>
       <p:ext uri="{BB962C8B-B14F-4D97-AF65-F5344CB8AC3E}">
         <p14:creationId xmlns:p14="http://schemas.microsoft.com/office/powerpoint/2010/main" val="4224231567"/>
+      </p:ext>
+    </p:extLst>
+  </p:cSld>
+  <p:clrMapOvr>
+    <a:masterClrMapping/>
+  </p:clrMapOvr>
+</p:notes>
+</file>
+
+<file path=ppt/notesSlides/notesSlide2.xml><?xml version="1.0" encoding="utf-8"?>
+<p:notes xmlns:a="http://schemas.openxmlformats.org/drawingml/2006/main" xmlns:r="http://schemas.openxmlformats.org/officeDocument/2006/relationships" xmlns:p="http://schemas.openxmlformats.org/presentationml/2006/main">
+  <p:cSld>
+    <p:spTree>
+      <p:nvGrpSpPr>
+        <p:cNvPr id="1" name=""/>
+        <p:cNvGrpSpPr/>
+        <p:nvPr/>
+      </p:nvGrpSpPr>
+      <p:grpSpPr>
+        <a:xfrm>
+          <a:off x="0" y="0"/>
+          <a:ext cx="0" cy="0"/>
+          <a:chOff x="0" y="0"/>
+          <a:chExt cx="0" cy="0"/>
+        </a:xfrm>
+      </p:grpSpPr>
+      <p:sp>
+        <p:nvSpPr>
+          <p:cNvPr id="2" name="Slide Image Placeholder 1"/>
+          <p:cNvSpPr>
+            <a:spLocks noGrp="1" noRot="1" noChangeAspect="1"/>
+          </p:cNvSpPr>
+          <p:nvPr>
+            <p:ph type="sldImg"/>
+          </p:nvPr>
+        </p:nvSpPr>
+        <p:spPr/>
+      </p:sp>
+      <p:sp>
+        <p:nvSpPr>
+          <p:cNvPr id="3" name="Notes Placeholder 2"/>
+          <p:cNvSpPr>
+            <a:spLocks noGrp="1"/>
+          </p:cNvSpPr>
+          <p:nvPr>
+            <p:ph type="body" idx="1"/>
+          </p:nvPr>
+        </p:nvSpPr>
+        <p:spPr/>
+        <p:txBody>
+          <a:bodyPr/>
+          <a:lstStyle/>
+          <a:p>
+            <a:r>
+              <a:rPr lang="en-US" dirty="0" err="1"/>
+              <a:t>StratifiedGroupKFold</a:t>
+            </a:r>
+            <a:endParaRPr lang="en-US" dirty="0"/>
+          </a:p>
+        </p:txBody>
+      </p:sp>
+      <p:sp>
+        <p:nvSpPr>
+          <p:cNvPr id="4" name="Slide Number Placeholder 3"/>
+          <p:cNvSpPr>
+            <a:spLocks noGrp="1"/>
+          </p:cNvSpPr>
+          <p:nvPr>
+            <p:ph type="sldNum" sz="quarter" idx="5"/>
+          </p:nvPr>
+        </p:nvSpPr>
+        <p:spPr/>
+        <p:txBody>
+          <a:bodyPr/>
+          <a:lstStyle/>
+          <a:p>
+            <a:fld id="{8D43F4A4-6BD8-4316-BA08-DBD597FF2FCD}" type="slidenum">
+              <a:rPr lang="en-US" smtClean="0"/>
+              <a:t>12</a:t>
+            </a:fld>
+            <a:endParaRPr lang="en-US"/>
+          </a:p>
+        </p:txBody>
+      </p:sp>
+    </p:spTree>
+    <p:extLst>
+      <p:ext uri="{BB962C8B-B14F-4D97-AF65-F5344CB8AC3E}">
+        <p14:creationId xmlns:p14="http://schemas.microsoft.com/office/powerpoint/2010/main" val="2202566424"/>
+      </p:ext>
+    </p:extLst>
+  </p:cSld>
+  <p:clrMapOvr>
+    <a:masterClrMapping/>
+  </p:clrMapOvr>
+</p:notes>
+</file>
+
+<file path=ppt/notesSlides/notesSlide3.xml><?xml version="1.0" encoding="utf-8"?>
+<p:notes xmlns:a="http://schemas.openxmlformats.org/drawingml/2006/main" xmlns:r="http://schemas.openxmlformats.org/officeDocument/2006/relationships" xmlns:p="http://schemas.openxmlformats.org/presentationml/2006/main">
+  <p:cSld>
+    <p:spTree>
+      <p:nvGrpSpPr>
+        <p:cNvPr id="1" name=""/>
+        <p:cNvGrpSpPr/>
+        <p:nvPr/>
+      </p:nvGrpSpPr>
+      <p:grpSpPr>
+        <a:xfrm>
+          <a:off x="0" y="0"/>
+          <a:ext cx="0" cy="0"/>
+          <a:chOff x="0" y="0"/>
+          <a:chExt cx="0" cy="0"/>
+        </a:xfrm>
+      </p:grpSpPr>
+      <p:sp>
+        <p:nvSpPr>
+          <p:cNvPr id="2" name="Slide Image Placeholder 1"/>
+          <p:cNvSpPr>
+            <a:spLocks noGrp="1" noRot="1" noChangeAspect="1"/>
+          </p:cNvSpPr>
+          <p:nvPr>
+            <p:ph type="sldImg"/>
+          </p:nvPr>
+        </p:nvSpPr>
+        <p:spPr/>
+      </p:sp>
+      <p:sp>
+        <p:nvSpPr>
+          <p:cNvPr id="3" name="Notes Placeholder 2"/>
+          <p:cNvSpPr>
+            <a:spLocks noGrp="1"/>
+          </p:cNvSpPr>
+          <p:nvPr>
+            <p:ph type="body" idx="1"/>
+          </p:nvPr>
+        </p:nvSpPr>
+        <p:spPr/>
+        <p:txBody>
+          <a:bodyPr/>
+          <a:lstStyle/>
+          <a:p>
+            <a:endParaRPr lang="en-US" dirty="0"/>
+          </a:p>
+        </p:txBody>
+      </p:sp>
+      <p:sp>
+        <p:nvSpPr>
+          <p:cNvPr id="4" name="Slide Number Placeholder 3"/>
+          <p:cNvSpPr>
+            <a:spLocks noGrp="1"/>
+          </p:cNvSpPr>
+          <p:nvPr>
+            <p:ph type="sldNum" sz="quarter" idx="5"/>
+          </p:nvPr>
+        </p:nvSpPr>
+        <p:spPr/>
+        <p:txBody>
+          <a:bodyPr/>
+          <a:lstStyle/>
+          <a:p>
+            <a:fld id="{8D43F4A4-6BD8-4316-BA08-DBD597FF2FCD}" type="slidenum">
+              <a:rPr lang="en-US" smtClean="0"/>
+              <a:t>13</a:t>
+            </a:fld>
+            <a:endParaRPr lang="en-US"/>
+          </a:p>
+        </p:txBody>
+      </p:sp>
+    </p:spTree>
+    <p:extLst>
+      <p:ext uri="{BB962C8B-B14F-4D97-AF65-F5344CB8AC3E}">
+        <p14:creationId xmlns:p14="http://schemas.microsoft.com/office/powerpoint/2010/main" val="2425737840"/>
       </p:ext>
     </p:extLst>
   </p:cSld>
@@ -1307,7 +1495,7 @@
           <a:p>
             <a:fld id="{FA5E43D9-CB38-4A5D-AF44-8464136E3953}" type="datetimeFigureOut">
               <a:rPr lang="en-US" smtClean="0"/>
-              <a:t>10/15/2024</a:t>
+              <a:t>10/16/2024</a:t>
             </a:fld>
             <a:endParaRPr lang="en-US"/>
           </a:p>
@@ -1505,7 +1693,7 @@
           <a:p>
             <a:fld id="{FA5E43D9-CB38-4A5D-AF44-8464136E3953}" type="datetimeFigureOut">
               <a:rPr lang="en-US" smtClean="0"/>
-              <a:t>10/15/2024</a:t>
+              <a:t>10/16/2024</a:t>
             </a:fld>
             <a:endParaRPr lang="en-US"/>
           </a:p>
@@ -1713,7 +1901,7 @@
           <a:p>
             <a:fld id="{FA5E43D9-CB38-4A5D-AF44-8464136E3953}" type="datetimeFigureOut">
               <a:rPr lang="en-US" smtClean="0"/>
-              <a:t>10/15/2024</a:t>
+              <a:t>10/16/2024</a:t>
             </a:fld>
             <a:endParaRPr lang="en-US"/>
           </a:p>
@@ -1911,7 +2099,7 @@
           <a:p>
             <a:fld id="{FA5E43D9-CB38-4A5D-AF44-8464136E3953}" type="datetimeFigureOut">
               <a:rPr lang="en-US" smtClean="0"/>
-              <a:t>10/15/2024</a:t>
+              <a:t>10/16/2024</a:t>
             </a:fld>
             <a:endParaRPr lang="en-US"/>
           </a:p>
@@ -2186,7 +2374,7 @@
           <a:p>
             <a:fld id="{FA5E43D9-CB38-4A5D-AF44-8464136E3953}" type="datetimeFigureOut">
               <a:rPr lang="en-US" smtClean="0"/>
-              <a:t>10/15/2024</a:t>
+              <a:t>10/16/2024</a:t>
             </a:fld>
             <a:endParaRPr lang="en-US"/>
           </a:p>
@@ -2451,7 +2639,7 @@
           <a:p>
             <a:fld id="{FA5E43D9-CB38-4A5D-AF44-8464136E3953}" type="datetimeFigureOut">
               <a:rPr lang="en-US" smtClean="0"/>
-              <a:t>10/15/2024</a:t>
+              <a:t>10/16/2024</a:t>
             </a:fld>
             <a:endParaRPr lang="en-US"/>
           </a:p>
@@ -2863,7 +3051,7 @@
           <a:p>
             <a:fld id="{FA5E43D9-CB38-4A5D-AF44-8464136E3953}" type="datetimeFigureOut">
               <a:rPr lang="en-US" smtClean="0"/>
-              <a:t>10/15/2024</a:t>
+              <a:t>10/16/2024</a:t>
             </a:fld>
             <a:endParaRPr lang="en-US"/>
           </a:p>
@@ -3004,7 +3192,7 @@
           <a:p>
             <a:fld id="{FA5E43D9-CB38-4A5D-AF44-8464136E3953}" type="datetimeFigureOut">
               <a:rPr lang="en-US" smtClean="0"/>
-              <a:t>10/15/2024</a:t>
+              <a:t>10/16/2024</a:t>
             </a:fld>
             <a:endParaRPr lang="en-US"/>
           </a:p>
@@ -3117,7 +3305,7 @@
           <a:p>
             <a:fld id="{FA5E43D9-CB38-4A5D-AF44-8464136E3953}" type="datetimeFigureOut">
               <a:rPr lang="en-US" smtClean="0"/>
-              <a:t>10/15/2024</a:t>
+              <a:t>10/16/2024</a:t>
             </a:fld>
             <a:endParaRPr lang="en-US"/>
           </a:p>
@@ -3428,7 +3616,7 @@
           <a:p>
             <a:fld id="{FA5E43D9-CB38-4A5D-AF44-8464136E3953}" type="datetimeFigureOut">
               <a:rPr lang="en-US" smtClean="0"/>
-              <a:t>10/15/2024</a:t>
+              <a:t>10/16/2024</a:t>
             </a:fld>
             <a:endParaRPr lang="en-US"/>
           </a:p>
@@ -3716,7 +3904,7 @@
           <a:p>
             <a:fld id="{FA5E43D9-CB38-4A5D-AF44-8464136E3953}" type="datetimeFigureOut">
               <a:rPr lang="en-US" smtClean="0"/>
-              <a:t>10/15/2024</a:t>
+              <a:t>10/16/2024</a:t>
             </a:fld>
             <a:endParaRPr lang="en-US"/>
           </a:p>
@@ -3957,7 +4145,7 @@
           <a:p>
             <a:fld id="{FA5E43D9-CB38-4A5D-AF44-8464136E3953}" type="datetimeFigureOut">
               <a:rPr lang="en-US" smtClean="0"/>
-              <a:t>10/15/2024</a:t>
+              <a:t>10/16/2024</a:t>
             </a:fld>
             <a:endParaRPr lang="en-US"/>
           </a:p>
@@ -4398,17 +4586,17 @@
           <a:lstStyle/>
           <a:p>
             <a:r>
-              <a:rPr lang="en-US" dirty="0"/>
+              <a:rPr lang="en-US"/>
               <a:t>Predicting Hospital No Shows</a:t>
             </a:r>
             <a:br>
-              <a:rPr lang="en-US" dirty="0"/>
+              <a:rPr lang="en-US"/>
             </a:br>
             <a:r>
-              <a:rPr lang="en-US" sz="2800" dirty="0"/>
+              <a:rPr lang="en-US" sz="2800"/>
               <a:t>EDA | Splitting | Preprocessing</a:t>
             </a:r>
-            <a:endParaRPr lang="en-US" dirty="0"/>
+            <a:endParaRPr lang="en-US"/>
           </a:p>
         </p:txBody>
       </p:sp>
@@ -4434,16 +4622,16 @@
           <a:lstStyle/>
           <a:p>
             <a:r>
-              <a:rPr lang="en-US" dirty="0"/>
+              <a:rPr lang="en-US"/>
               <a:t>By Dennis Wang</a:t>
             </a:r>
           </a:p>
           <a:p>
-            <a:endParaRPr lang="en-US" dirty="0"/>
-          </a:p>
-          <a:p>
-            <a:r>
-              <a:rPr lang="en-US" dirty="0"/>
+            <a:endParaRPr lang="en-US"/>
+          </a:p>
+          <a:p>
+            <a:r>
+              <a:rPr lang="en-US"/>
               <a:t>Brown University</a:t>
             </a:r>
           </a:p>
@@ -4478,7 +4666,7 @@
           <a:lstStyle/>
           <a:p>
             <a:r>
-              <a:rPr lang="en-US" dirty="0"/>
+              <a:rPr lang="en-US"/>
               <a:t>Presentation Slot: 10/23/24, 1:30 PM</a:t>
             </a:r>
           </a:p>
@@ -4513,12 +4701,12 @@
           <a:lstStyle/>
           <a:p>
             <a:r>
-              <a:rPr lang="en-US" dirty="0">
+              <a:rPr lang="en-US">
                 <a:hlinkClick r:id="rId2"/>
               </a:rPr>
               <a:t>https://github.com/dwang0120/Hospital-No-Shows</a:t>
             </a:r>
-            <a:endParaRPr lang="en-US" dirty="0"/>
+            <a:endParaRPr lang="en-US"/>
           </a:p>
         </p:txBody>
       </p:sp>
@@ -4574,15 +4762,15 @@
           <a:lstStyle/>
           <a:p>
             <a:r>
-              <a:rPr lang="en-US" dirty="0"/>
+              <a:rPr lang="en-US"/>
               <a:t>EDA (3/3) (</a:t>
             </a:r>
             <a:r>
-              <a:rPr lang="en-US" dirty="0" err="1"/>
+              <a:rPr lang="en-US" err="1"/>
               <a:t>wip</a:t>
             </a:r>
             <a:r>
-              <a:rPr lang="en-US" dirty="0"/>
+              <a:rPr lang="en-US"/>
               <a:t>)</a:t>
             </a:r>
           </a:p>
@@ -4615,7 +4803,7 @@
           <a:lstStyle/>
           <a:p>
             <a:r>
-              <a:rPr lang="en-US" dirty="0"/>
+              <a:rPr lang="en-US"/>
               <a:t>Definitely more representation from some neighborhoods than others</a:t>
             </a:r>
           </a:p>
@@ -4703,7 +4891,7 @@
           <a:lstStyle/>
           <a:p>
             <a:r>
-              <a:rPr lang="en-US" dirty="0"/>
+              <a:rPr lang="en-US"/>
               <a:t>EDA (?/3) pick and choose one to replace</a:t>
             </a:r>
           </a:p>
@@ -4736,19 +4924,19 @@
           <a:lstStyle/>
           <a:p>
             <a:r>
-              <a:rPr lang="en-US" dirty="0"/>
+              <a:rPr lang="en-US"/>
               <a:t>People who show up tend to schedule their appointments closer to the day of</a:t>
             </a:r>
           </a:p>
           <a:p>
             <a:r>
-              <a:rPr lang="en-US" dirty="0"/>
+              <a:rPr lang="en-US"/>
               <a:t>Negative date diff?</a:t>
             </a:r>
           </a:p>
           <a:p>
             <a:r>
-              <a:rPr lang="en-US" dirty="0"/>
+              <a:rPr lang="en-US"/>
               <a:t>Large outlier count</a:t>
             </a:r>
           </a:p>
@@ -4836,7 +5024,7 @@
           <a:lstStyle/>
           <a:p>
             <a:r>
-              <a:rPr lang="en-US" dirty="0"/>
+              <a:rPr lang="en-US"/>
               <a:t>Splitting Data</a:t>
             </a:r>
           </a:p>
@@ -4966,7 +5154,7 @@
           <a:lstStyle/>
           <a:p>
             <a:r>
-              <a:rPr lang="en-US" dirty="0"/>
+              <a:rPr lang="en-US"/>
               <a:t>Preprocessing</a:t>
             </a:r>
           </a:p>
@@ -5258,7 +5446,7 @@
           <a:lstStyle/>
           <a:p>
             <a:r>
-              <a:rPr lang="en-US" dirty="0"/>
+              <a:rPr lang="en-US"/>
               <a:t>Sourcing the Data</a:t>
             </a:r>
           </a:p>
@@ -5286,16 +5474,16 @@
           <a:lstStyle/>
           <a:p>
             <a:r>
-              <a:rPr lang="en-US" dirty="0">
+              <a:rPr lang="en-US">
                 <a:hlinkClick r:id="rId2"/>
               </a:rPr>
               <a:t>Kaggle Link</a:t>
             </a:r>
-            <a:endParaRPr lang="en-US" dirty="0"/>
-          </a:p>
-          <a:p>
-            <a:r>
-              <a:rPr lang="en-US" dirty="0"/>
+            <a:endParaRPr lang="en-US"/>
+          </a:p>
+          <a:p>
+            <a:r>
+              <a:rPr lang="en-US"/>
               <a:t>100k + medical appointments in various neighborhoods in Brazil</a:t>
             </a:r>
           </a:p>
@@ -5353,7 +5541,7 @@
           <a:lstStyle/>
           <a:p>
             <a:r>
-              <a:rPr lang="en-US" dirty="0"/>
+              <a:rPr lang="en-US"/>
               <a:t>Loading in the Data (1/3)</a:t>
             </a:r>
           </a:p>
@@ -5380,7 +5568,7 @@
           <a:bodyPr/>
           <a:lstStyle/>
           <a:p>
-            <a:endParaRPr lang="en-US" dirty="0"/>
+            <a:endParaRPr lang="en-US"/>
           </a:p>
         </p:txBody>
       </p:sp>
@@ -5533,8 +5721,8 @@
           </a:prstGeom>
         </p:spPr>
       </p:pic>
-      <mc:AlternateContent xmlns:mc="http://schemas.openxmlformats.org/markup-compatibility/2006">
-        <mc:Choice xmlns:p14="http://schemas.microsoft.com/office/powerpoint/2010/main" Requires="p14">
+      <mc:AlternateContent xmlns:mc="http://schemas.openxmlformats.org/markup-compatibility/2006" xmlns:p14="http://schemas.microsoft.com/office/powerpoint/2010/main">
+        <mc:Choice Requires="p14">
           <p:contentPart p14:bwMode="auto" r:id="rId3">
             <p14:nvContentPartPr>
               <p14:cNvPr id="5" name="Ink 4">
@@ -5553,7 +5741,7 @@
             </p14:xfrm>
           </p:contentPart>
         </mc:Choice>
-        <mc:Fallback>
+        <mc:Fallback xmlns="">
           <p:pic>
             <p:nvPicPr>
               <p:cNvPr id="5" name="Ink 4">
@@ -5844,7 +6032,7 @@
           <a:lstStyle/>
           <a:p>
             <a:r>
-              <a:rPr lang="en-US" dirty="0"/>
+              <a:rPr lang="en-US"/>
               <a:t>Loading in the Data (3/3)</a:t>
             </a:r>
           </a:p>
@@ -6017,7 +6205,7 @@
           <a:lstStyle/>
           <a:p>
             <a:r>
-              <a:rPr lang="en-US" dirty="0"/>
+              <a:rPr lang="en-US"/>
               <a:t>Data Characteristics and Project Goal	</a:t>
             </a:r>
           </a:p>
@@ -6045,33 +6233,33 @@
           <a:lstStyle/>
           <a:p>
             <a:r>
-              <a:rPr lang="en-US" dirty="0"/>
+              <a:rPr lang="en-US"/>
               <a:t>Goal: Predicting ‘</a:t>
             </a:r>
             <a:r>
-              <a:rPr lang="en-US" dirty="0" err="1"/>
+              <a:rPr lang="en-US" err="1"/>
               <a:t>ShowedUp</a:t>
             </a:r>
             <a:r>
-              <a:rPr lang="en-US" dirty="0"/>
+              <a:rPr lang="en-US"/>
               <a:t>’ – Whether or not a patient will show up to their appointment.</a:t>
             </a:r>
           </a:p>
           <a:p>
             <a:pPr lvl="1"/>
             <a:r>
-              <a:rPr lang="en-US" dirty="0"/>
+              <a:rPr lang="en-US"/>
               <a:t>Classification Problem</a:t>
             </a:r>
           </a:p>
           <a:p>
             <a:r>
-              <a:rPr lang="en-US" dirty="0"/>
+              <a:rPr lang="en-US"/>
               <a:t>15 Features</a:t>
             </a:r>
           </a:p>
           <a:p>
-            <a:endParaRPr lang="en-US" dirty="0"/>
+            <a:endParaRPr lang="en-US"/>
           </a:p>
         </p:txBody>
       </p:sp>
@@ -6157,7 +6345,7 @@
           <a:lstStyle/>
           <a:p>
             <a:r>
-              <a:rPr lang="en-US" dirty="0"/>
+              <a:rPr lang="en-US"/>
               <a:t>Notable Features</a:t>
             </a:r>
           </a:p>
@@ -6185,32 +6373,32 @@
           <a:lstStyle/>
           <a:p>
             <a:r>
-              <a:rPr lang="en-US" dirty="0" err="1"/>
+              <a:rPr lang="en-US" err="1"/>
               <a:t>PatientID</a:t>
             </a:r>
             <a:r>
-              <a:rPr lang="en-US" dirty="0"/>
+              <a:rPr lang="en-US"/>
               <a:t> – Repeated patients</a:t>
             </a:r>
           </a:p>
           <a:p>
             <a:r>
-              <a:rPr lang="en-US" dirty="0"/>
+              <a:rPr lang="en-US"/>
               <a:t>Scholarship – Whether or not the patient is on Brazil’s social welfare program  “Bolsa Família”</a:t>
             </a:r>
           </a:p>
           <a:p>
             <a:r>
-              <a:rPr lang="en-US" dirty="0" err="1"/>
+              <a:rPr lang="en-US" err="1"/>
               <a:t>SMS_received</a:t>
             </a:r>
             <a:r>
-              <a:rPr lang="en-US" dirty="0"/>
+              <a:rPr lang="en-US"/>
               <a:t> – whether 1 or more text messages were sent to the patient</a:t>
             </a:r>
           </a:p>
           <a:p>
-            <a:endParaRPr lang="en-US" dirty="0"/>
+            <a:endParaRPr lang="en-US"/>
           </a:p>
         </p:txBody>
       </p:sp>
@@ -6296,15 +6484,15 @@
           <a:lstStyle/>
           <a:p>
             <a:r>
-              <a:rPr lang="en-US" dirty="0"/>
+              <a:rPr lang="en-US"/>
               <a:t>EDA (1/3) (</a:t>
             </a:r>
             <a:r>
-              <a:rPr lang="en-US" dirty="0" err="1"/>
+              <a:rPr lang="en-US" err="1"/>
               <a:t>wip</a:t>
             </a:r>
             <a:r>
-              <a:rPr lang="en-US" dirty="0"/>
+              <a:rPr lang="en-US"/>
               <a:t>) </a:t>
             </a:r>
           </a:p>
@@ -6332,13 +6520,13 @@
           <a:lstStyle/>
           <a:p>
             <a:r>
-              <a:rPr lang="en-US" dirty="0"/>
+              <a:rPr lang="en-US"/>
               <a:t>Visualizing our target variable</a:t>
             </a:r>
           </a:p>
           <a:p>
             <a:r>
-              <a:rPr lang="en-US" dirty="0"/>
+              <a:rPr lang="en-US"/>
               <a:t>It’s wildly imbalanced!</a:t>
             </a:r>
           </a:p>
@@ -6426,15 +6614,15 @@
           <a:lstStyle/>
           <a:p>
             <a:r>
-              <a:rPr lang="en-US" dirty="0"/>
+              <a:rPr lang="en-US"/>
               <a:t>EDA (2/3) (</a:t>
             </a:r>
             <a:r>
-              <a:rPr lang="en-US" dirty="0" err="1"/>
+              <a:rPr lang="en-US" err="1"/>
               <a:t>wip</a:t>
             </a:r>
             <a:r>
-              <a:rPr lang="en-US" dirty="0"/>
+              <a:rPr lang="en-US"/>
               <a:t>)</a:t>
             </a:r>
           </a:p>
@@ -6462,21 +6650,21 @@
           <a:lstStyle/>
           <a:p>
             <a:r>
-              <a:rPr lang="en-US" dirty="0"/>
+              <a:rPr lang="en-US"/>
               <a:t>Gender is unbalanced</a:t>
             </a:r>
           </a:p>
           <a:p>
             <a:r>
-              <a:rPr lang="en-US" dirty="0"/>
+              <a:rPr lang="en-US"/>
               <a:t>Also provide a normalized plot to see if the % </a:t>
             </a:r>
             <a:r>
-              <a:rPr lang="en-US" dirty="0" err="1"/>
+              <a:rPr lang="en-US" err="1"/>
               <a:t>ShowedUp</a:t>
             </a:r>
             <a:r>
-              <a:rPr lang="en-US" dirty="0"/>
+              <a:rPr lang="en-US"/>
               <a:t> is different between genders?</a:t>
             </a:r>
           </a:p>

</xml_diff>